<commit_message>
Geraden eingefügt, Bilder abgespeichert
</commit_message>
<xml_diff>
--- a/Vortrag/Abschlussprojekt.pptx
+++ b/Vortrag/Abschlussprojekt.pptx
@@ -129,6 +129,587 @@
 </p:presentation>
 </file>
 
+<file path=ppt/charts/chart1.xml><?xml version="1.0" encoding="utf-8"?>
+<c:chartSpace xmlns:c="http://schemas.openxmlformats.org/drawingml/2006/chart" xmlns:a="http://schemas.openxmlformats.org/drawingml/2006/main" xmlns:r="http://schemas.openxmlformats.org/officeDocument/2006/relationships">
+  <c:date1904 val="0"/>
+  <c:lang val="de-DE"/>
+  <c:roundedCorners val="0"/>
+  <mc:AlternateContent xmlns:mc="http://schemas.openxmlformats.org/markup-compatibility/2006">
+    <mc:Choice xmlns:c14="http://schemas.microsoft.com/office/drawing/2007/8/2/chart" Requires="c14">
+      <c14:style val="102"/>
+    </mc:Choice>
+    <mc:Fallback>
+      <c:style val="2"/>
+    </mc:Fallback>
+  </mc:AlternateContent>
+  <c:chart>
+    <c:title>
+      <c:tx>
+        <c:rich>
+          <a:bodyPr/>
+          <a:lstStyle/>
+          <a:p>
+            <a:pPr>
+              <a:defRPr/>
+            </a:pPr>
+            <a:r>
+              <a:rPr lang="de-DE"/>
+              <a:t>Abhängigkeit der Extinktion von der Massenkonzentration in mg/L</a:t>
+            </a:r>
+          </a:p>
+        </c:rich>
+      </c:tx>
+      <c:layout>
+        <c:manualLayout>
+          <c:xMode val="edge"/>
+          <c:yMode val="edge"/>
+          <c:x val="0.14541869301491708"/>
+          <c:y val="4.0102961403434133E-2"/>
+        </c:manualLayout>
+      </c:layout>
+      <c:overlay val="1"/>
+    </c:title>
+    <c:autoTitleDeleted val="0"/>
+    <c:plotArea>
+      <c:layout>
+        <c:manualLayout>
+          <c:layoutTarget val="inner"/>
+          <c:xMode val="edge"/>
+          <c:yMode val="edge"/>
+          <c:x val="0.1229890300092346"/>
+          <c:y val="0.13604609729879213"/>
+          <c:w val="0.79397932074194955"/>
+          <c:h val="0.7193003769977524"/>
+        </c:manualLayout>
+      </c:layout>
+      <c:scatterChart>
+        <c:scatterStyle val="lineMarker"/>
+        <c:varyColors val="0"/>
+        <c:ser>
+          <c:idx val="0"/>
+          <c:order val="0"/>
+          <c:spPr>
+            <a:ln w="28575">
+              <a:noFill/>
+            </a:ln>
+          </c:spPr>
+          <c:trendline>
+            <c:trendlineType val="linear"/>
+            <c:dispRSqr val="1"/>
+            <c:dispEq val="1"/>
+            <c:trendlineLbl>
+              <c:layout>
+                <c:manualLayout>
+                  <c:x val="2.6878005532711278E-2"/>
+                  <c:y val="0.28186897416857404"/>
+                </c:manualLayout>
+              </c:layout>
+              <c:numFmt formatCode="General" sourceLinked="0"/>
+            </c:trendlineLbl>
+          </c:trendline>
+          <c:xVal>
+            <c:numRef>
+              <c:f>Tabelle1!$B$2:$B$7</c:f>
+              <c:numCache>
+                <c:formatCode>#,##0.000</c:formatCode>
+                <c:ptCount val="6"/>
+                <c:pt idx="0">
+                  <c:v>1.0040000000000002</c:v>
+                </c:pt>
+                <c:pt idx="1">
+                  <c:v>3.0320000000000005</c:v>
+                </c:pt>
+                <c:pt idx="2">
+                  <c:v>5.0200000000000005</c:v>
+                </c:pt>
+                <c:pt idx="3">
+                  <c:v>10.040000000000001</c:v>
+                </c:pt>
+                <c:pt idx="4">
+                  <c:v>30.32</c:v>
+                </c:pt>
+                <c:pt idx="5">
+                  <c:v>60.64</c:v>
+                </c:pt>
+              </c:numCache>
+            </c:numRef>
+          </c:xVal>
+          <c:yVal>
+            <c:numRef>
+              <c:f>Tabelle1!$C$2:$C$7</c:f>
+              <c:numCache>
+                <c:formatCode>0.0000</c:formatCode>
+                <c:ptCount val="6"/>
+                <c:pt idx="0">
+                  <c:v>0.04</c:v>
+                </c:pt>
+                <c:pt idx="1">
+                  <c:v>0.1353</c:v>
+                </c:pt>
+                <c:pt idx="2">
+                  <c:v>0.16869999999999999</c:v>
+                </c:pt>
+                <c:pt idx="3">
+                  <c:v>0.32140000000000002</c:v>
+                </c:pt>
+                <c:pt idx="4">
+                  <c:v>0.94530000000000003</c:v>
+                </c:pt>
+                <c:pt idx="5">
+                  <c:v>1.8987000000000001</c:v>
+                </c:pt>
+              </c:numCache>
+            </c:numRef>
+          </c:yVal>
+          <c:smooth val="0"/>
+        </c:ser>
+        <c:dLbls>
+          <c:showLegendKey val="0"/>
+          <c:showVal val="0"/>
+          <c:showCatName val="0"/>
+          <c:showSerName val="0"/>
+          <c:showPercent val="0"/>
+          <c:showBubbleSize val="0"/>
+        </c:dLbls>
+        <c:axId val="88979072"/>
+        <c:axId val="88979648"/>
+      </c:scatterChart>
+      <c:valAx>
+        <c:axId val="88979072"/>
+        <c:scaling>
+          <c:orientation val="minMax"/>
+        </c:scaling>
+        <c:delete val="0"/>
+        <c:axPos val="b"/>
+        <c:majorGridlines>
+          <c:spPr>
+            <a:ln>
+              <a:noFill/>
+            </a:ln>
+          </c:spPr>
+        </c:majorGridlines>
+        <c:title>
+          <c:tx>
+            <c:rich>
+              <a:bodyPr/>
+              <a:lstStyle/>
+              <a:p>
+                <a:pPr>
+                  <a:defRPr/>
+                </a:pPr>
+                <a:r>
+                  <a:rPr lang="en-US"/>
+                  <a:t>Massenkonzentration in mg/L --&gt;</a:t>
+                </a:r>
+              </a:p>
+            </c:rich>
+          </c:tx>
+          <c:layout>
+            <c:manualLayout>
+              <c:xMode val="edge"/>
+              <c:yMode val="edge"/>
+              <c:x val="0.34616116700462868"/>
+              <c:y val="0.93355073913763176"/>
+            </c:manualLayout>
+          </c:layout>
+          <c:overlay val="0"/>
+        </c:title>
+        <c:numFmt formatCode="#,##0.000" sourceLinked="1"/>
+        <c:majorTickMark val="in"/>
+        <c:minorTickMark val="none"/>
+        <c:tickLblPos val="nextTo"/>
+        <c:crossAx val="88979648"/>
+        <c:crosses val="autoZero"/>
+        <c:crossBetween val="midCat"/>
+      </c:valAx>
+      <c:valAx>
+        <c:axId val="88979648"/>
+        <c:scaling>
+          <c:orientation val="minMax"/>
+        </c:scaling>
+        <c:delete val="0"/>
+        <c:axPos val="l"/>
+        <c:majorGridlines>
+          <c:spPr>
+            <a:ln>
+              <a:noFill/>
+            </a:ln>
+          </c:spPr>
+        </c:majorGridlines>
+        <c:title>
+          <c:tx>
+            <c:rich>
+              <a:bodyPr rot="-5400000" vert="horz"/>
+              <a:lstStyle/>
+              <a:p>
+                <a:pPr>
+                  <a:defRPr/>
+                </a:pPr>
+                <a:r>
+                  <a:rPr lang="en-US"/>
+                  <a:t>Extinktion --&gt;</a:t>
+                </a:r>
+              </a:p>
+            </c:rich>
+          </c:tx>
+          <c:layout>
+            <c:manualLayout>
+              <c:xMode val="edge"/>
+              <c:yMode val="edge"/>
+              <c:x val="2.4949542141756188E-2"/>
+              <c:y val="0.43070829840459018"/>
+            </c:manualLayout>
+          </c:layout>
+          <c:overlay val="0"/>
+        </c:title>
+        <c:numFmt formatCode="0.0000" sourceLinked="1"/>
+        <c:majorTickMark val="in"/>
+        <c:minorTickMark val="none"/>
+        <c:tickLblPos val="nextTo"/>
+        <c:crossAx val="88979072"/>
+        <c:crosses val="autoZero"/>
+        <c:crossBetween val="midCat"/>
+      </c:valAx>
+    </c:plotArea>
+    <c:plotVisOnly val="1"/>
+    <c:dispBlanksAs val="gap"/>
+    <c:showDLblsOverMax val="0"/>
+  </c:chart>
+  <c:externalData r:id="rId1">
+    <c:autoUpdate val="0"/>
+  </c:externalData>
+</c:chartSpace>
+</file>
+
+<file path=ppt/charts/chart2.xml><?xml version="1.0" encoding="utf-8"?>
+<c:chartSpace xmlns:c="http://schemas.openxmlformats.org/drawingml/2006/chart" xmlns:a="http://schemas.openxmlformats.org/drawingml/2006/main" xmlns:r="http://schemas.openxmlformats.org/officeDocument/2006/relationships">
+  <c:date1904 val="0"/>
+  <c:lang val="de-DE"/>
+  <c:roundedCorners val="0"/>
+  <mc:AlternateContent xmlns:mc="http://schemas.openxmlformats.org/markup-compatibility/2006">
+    <mc:Choice xmlns:c14="http://schemas.microsoft.com/office/drawing/2007/8/2/chart" Requires="c14">
+      <c14:style val="102"/>
+    </mc:Choice>
+    <mc:Fallback>
+      <c:style val="2"/>
+    </mc:Fallback>
+  </mc:AlternateContent>
+  <c:chart>
+    <c:title>
+      <c:layout/>
+      <c:overlay val="0"/>
+    </c:title>
+    <c:autoTitleDeleted val="0"/>
+    <c:plotArea>
+      <c:layout/>
+      <c:scatterChart>
+        <c:scatterStyle val="lineMarker"/>
+        <c:varyColors val="0"/>
+        <c:ser>
+          <c:idx val="0"/>
+          <c:order val="0"/>
+          <c:tx>
+            <c:v>Abhängigkeit der Extinktion vom Massenanteil in mg/kg</c:v>
+          </c:tx>
+          <c:spPr>
+            <a:ln w="28575">
+              <a:noFill/>
+            </a:ln>
+          </c:spPr>
+          <c:dPt>
+            <c:idx val="3"/>
+            <c:marker>
+              <c:spPr>
+                <a:solidFill>
+                  <a:srgbClr val="FF0000"/>
+                </a:solidFill>
+              </c:spPr>
+            </c:marker>
+            <c:bubble3D val="0"/>
+          </c:dPt>
+          <c:trendline>
+            <c:trendlineType val="linear"/>
+            <c:backward val="28"/>
+            <c:dispRSqr val="1"/>
+            <c:dispEq val="1"/>
+            <c:trendlineLbl>
+              <c:layout>
+                <c:manualLayout>
+                  <c:x val="4.2178344907561012E-2"/>
+                  <c:y val="0.26917608345292382"/>
+                </c:manualLayout>
+              </c:layout>
+              <c:tx>
+                <c:rich>
+                  <a:bodyPr/>
+                  <a:lstStyle/>
+                  <a:p>
+                    <a:pPr>
+                      <a:defRPr/>
+                    </a:pPr>
+                    <a:r>
+                      <a:rPr lang="en-US" baseline="0"/>
+                      <a:t>y = 0,0058x + 0,1572
+R² = 0,9988</a:t>
+                    </a:r>
+                    <a:endParaRPr lang="en-US"/>
+                  </a:p>
+                </c:rich>
+              </c:tx>
+              <c:numFmt formatCode="General" sourceLinked="0"/>
+            </c:trendlineLbl>
+          </c:trendline>
+          <c:xVal>
+            <c:numRef>
+              <c:f>Tabelle2!$B$41:$B$44</c:f>
+              <c:numCache>
+                <c:formatCode>General</c:formatCode>
+                <c:ptCount val="4"/>
+                <c:pt idx="0">
+                  <c:v>0</c:v>
+                </c:pt>
+                <c:pt idx="1">
+                  <c:v>47.9</c:v>
+                </c:pt>
+                <c:pt idx="2">
+                  <c:v>73.099999999999994</c:v>
+                </c:pt>
+                <c:pt idx="3" formatCode="0.0">
+                  <c:v>-27.103448275862071</c:v>
+                </c:pt>
+              </c:numCache>
+            </c:numRef>
+          </c:xVal>
+          <c:yVal>
+            <c:numRef>
+              <c:f>Tabelle2!$C$41:$C$44</c:f>
+              <c:numCache>
+                <c:formatCode>General</c:formatCode>
+                <c:ptCount val="4"/>
+                <c:pt idx="0">
+                  <c:v>0.15290000000000001</c:v>
+                </c:pt>
+                <c:pt idx="1">
+                  <c:v>0.44790000000000002</c:v>
+                </c:pt>
+                <c:pt idx="2">
+                  <c:v>0.57340000000000002</c:v>
+                </c:pt>
+                <c:pt idx="3">
+                  <c:v>0</c:v>
+                </c:pt>
+              </c:numCache>
+            </c:numRef>
+          </c:yVal>
+          <c:smooth val="0"/>
+        </c:ser>
+        <c:dLbls>
+          <c:showLegendKey val="0"/>
+          <c:showVal val="0"/>
+          <c:showCatName val="0"/>
+          <c:showSerName val="0"/>
+          <c:showPercent val="0"/>
+          <c:showBubbleSize val="0"/>
+        </c:dLbls>
+        <c:axId val="45516480"/>
+        <c:axId val="77611008"/>
+      </c:scatterChart>
+      <c:valAx>
+        <c:axId val="45516480"/>
+        <c:scaling>
+          <c:orientation val="minMax"/>
+          <c:min val="-30"/>
+        </c:scaling>
+        <c:delete val="0"/>
+        <c:axPos val="b"/>
+        <c:title>
+          <c:tx>
+            <c:rich>
+              <a:bodyPr/>
+              <a:lstStyle/>
+              <a:p>
+                <a:pPr>
+                  <a:defRPr/>
+                </a:pPr>
+                <a:r>
+                  <a:rPr lang="de-DE"/>
+                  <a:t>Massenanteil in mg/kg --&gt;</a:t>
+                </a:r>
+              </a:p>
+            </c:rich>
+          </c:tx>
+          <c:layout/>
+          <c:overlay val="0"/>
+        </c:title>
+        <c:numFmt formatCode="General" sourceLinked="1"/>
+        <c:majorTickMark val="out"/>
+        <c:minorTickMark val="none"/>
+        <c:tickLblPos val="nextTo"/>
+        <c:crossAx val="77611008"/>
+        <c:crosses val="autoZero"/>
+        <c:crossBetween val="midCat"/>
+      </c:valAx>
+      <c:valAx>
+        <c:axId val="77611008"/>
+        <c:scaling>
+          <c:orientation val="minMax"/>
+          <c:max val="0.60000000000000009"/>
+          <c:min val="0"/>
+        </c:scaling>
+        <c:delete val="0"/>
+        <c:axPos val="l"/>
+        <c:title>
+          <c:tx>
+            <c:rich>
+              <a:bodyPr rot="-5400000" vert="horz"/>
+              <a:lstStyle/>
+              <a:p>
+                <a:pPr>
+                  <a:defRPr/>
+                </a:pPr>
+                <a:r>
+                  <a:rPr lang="de-DE"/>
+                  <a:t>Extinktion</a:t>
+                </a:r>
+                <a:r>
+                  <a:rPr lang="de-DE" baseline="0"/>
+                  <a:t> --&gt;</a:t>
+                </a:r>
+                <a:endParaRPr lang="de-DE"/>
+              </a:p>
+            </c:rich>
+          </c:tx>
+          <c:layout/>
+          <c:overlay val="0"/>
+        </c:title>
+        <c:numFmt formatCode="General" sourceLinked="1"/>
+        <c:majorTickMark val="in"/>
+        <c:minorTickMark val="none"/>
+        <c:tickLblPos val="nextTo"/>
+        <c:crossAx val="45516480"/>
+        <c:crosses val="autoZero"/>
+        <c:crossBetween val="midCat"/>
+      </c:valAx>
+    </c:plotArea>
+    <c:plotVisOnly val="1"/>
+    <c:dispBlanksAs val="gap"/>
+    <c:showDLblsOverMax val="0"/>
+  </c:chart>
+  <c:externalData r:id="rId1">
+    <c:autoUpdate val="0"/>
+  </c:externalData>
+  <c:userShapes r:id="rId2"/>
+</c:chartSpace>
+</file>
+
+<file path=ppt/drawings/drawing1.xml><?xml version="1.0" encoding="utf-8"?>
+<c:userShapes xmlns:c="http://schemas.openxmlformats.org/drawingml/2006/chart">
+  <cdr:relSizeAnchor xmlns:cdr="http://schemas.openxmlformats.org/drawingml/2006/chartDrawing">
+    <cdr:from>
+      <cdr:x>0.0565</cdr:x>
+      <cdr:y>0.77537</cdr:y>
+    </cdr:from>
+    <cdr:to>
+      <cdr:x>0.08051</cdr:x>
+      <cdr:y>0.84881</cdr:y>
+    </cdr:to>
+    <cdr:sp macro="" textlink="">
+      <cdr:nvSpPr>
+        <cdr:cNvPr id="3" name="Pfeil nach unten 1"/>
+        <cdr:cNvSpPr/>
+      </cdr:nvSpPr>
+      <cdr:spPr>
+        <a:xfrm xmlns:a="http://schemas.openxmlformats.org/drawingml/2006/main">
+          <a:off x="380986" y="3419437"/>
+          <a:ext cx="161917" cy="323876"/>
+        </a:xfrm>
+        <a:prstGeom xmlns:a="http://schemas.openxmlformats.org/drawingml/2006/main" prst="downArrow">
+          <a:avLst/>
+        </a:prstGeom>
+      </cdr:spPr>
+      <cdr:style>
+        <a:lnRef xmlns:a="http://schemas.openxmlformats.org/drawingml/2006/main" idx="1">
+          <a:schemeClr val="accent2"/>
+        </a:lnRef>
+        <a:fillRef xmlns:a="http://schemas.openxmlformats.org/drawingml/2006/main" idx="3">
+          <a:schemeClr val="accent2"/>
+        </a:fillRef>
+        <a:effectRef xmlns:a="http://schemas.openxmlformats.org/drawingml/2006/main" idx="2">
+          <a:schemeClr val="accent2"/>
+        </a:effectRef>
+        <a:fontRef xmlns:a="http://schemas.openxmlformats.org/drawingml/2006/main" idx="minor">
+          <a:schemeClr val="lt1"/>
+        </a:fontRef>
+      </cdr:style>
+      <cdr:txBody>
+        <a:bodyPr xmlns:a="http://schemas.openxmlformats.org/drawingml/2006/main" vertOverflow="clip"/>
+        <a:lstStyle xmlns:a="http://schemas.openxmlformats.org/drawingml/2006/main"/>
+        <a:p xmlns:a="http://schemas.openxmlformats.org/drawingml/2006/main">
+          <a:endParaRPr lang="de-DE" b="1" cap="none" spc="0">
+            <a:ln w="18000">
+              <a:solidFill>
+                <a:schemeClr val="accent2">
+                  <a:satMod val="140000"/>
+                </a:schemeClr>
+              </a:solidFill>
+              <a:prstDash val="solid"/>
+              <a:miter lim="800000"/>
+            </a:ln>
+            <a:noFill/>
+            <a:effectLst>
+              <a:outerShdw blurRad="25500" dist="23000" dir="7020000" algn="tl">
+                <a:srgbClr val="000000">
+                  <a:alpha val="50000"/>
+                </a:srgbClr>
+              </a:outerShdw>
+            </a:effectLst>
+          </a:endParaRPr>
+        </a:p>
+      </cdr:txBody>
+    </cdr:sp>
+  </cdr:relSizeAnchor>
+  <cdr:relSizeAnchor xmlns:cdr="http://schemas.openxmlformats.org/drawingml/2006/chartDrawing">
+    <cdr:from>
+      <cdr:x>0.01836</cdr:x>
+      <cdr:y>0.69114</cdr:y>
+    </cdr:from>
+    <cdr:to>
+      <cdr:x>0.13277</cdr:x>
+      <cdr:y>0.7581</cdr:y>
+    </cdr:to>
+    <cdr:sp macro="" textlink="">
+      <cdr:nvSpPr>
+        <cdr:cNvPr id="5" name="Textfeld 4"/>
+        <cdr:cNvSpPr txBox="1"/>
+      </cdr:nvSpPr>
+      <cdr:spPr>
+        <a:xfrm xmlns:a="http://schemas.openxmlformats.org/drawingml/2006/main">
+          <a:off x="123825" y="3048000"/>
+          <a:ext cx="771525" cy="295275"/>
+        </a:xfrm>
+        <a:prstGeom xmlns:a="http://schemas.openxmlformats.org/drawingml/2006/main" prst="rect">
+          <a:avLst/>
+        </a:prstGeom>
+      </cdr:spPr>
+      <cdr:txBody>
+        <a:bodyPr xmlns:a="http://schemas.openxmlformats.org/drawingml/2006/main" vertOverflow="clip" wrap="none" rtlCol="0"/>
+        <a:lstStyle xmlns:a="http://schemas.openxmlformats.org/drawingml/2006/main"/>
+        <a:p xmlns:a="http://schemas.openxmlformats.org/drawingml/2006/main">
+          <a:r>
+            <a:rPr lang="de-DE" sz="1100" b="1">
+              <a:solidFill>
+                <a:srgbClr val="FF0000"/>
+              </a:solidFill>
+            </a:rPr>
+            <a:t>27 mg/kg</a:t>
+          </a:r>
+        </a:p>
+      </cdr:txBody>
+    </cdr:sp>
+  </cdr:relSizeAnchor>
+</c:userShapes>
+</file>
+
 <file path=ppt/notesMasters/notesMaster1.xml><?xml version="1.0" encoding="utf-8"?>
 <p:notesMaster xmlns:a="http://schemas.openxmlformats.org/drawingml/2006/main" xmlns:r="http://schemas.openxmlformats.org/officeDocument/2006/relationships" xmlns:p="http://schemas.openxmlformats.org/presentationml/2006/main">
   <p:cSld>
@@ -212,7 +793,7 @@
             <a:fld id="{19491150-8A65-441D-A330-1719206D58D9}" type="datetimeFigureOut">
               <a:rPr lang="en-US" smtClean="0"/>
               <a:pPr/>
-              <a:t>6/13/2015</a:t>
+              <a:t>6/15/2015</a:t>
             </a:fld>
             <a:endParaRPr lang="en-US"/>
           </a:p>
@@ -788,7 +1369,7 @@
             <a:fld id="{EBB374AE-5038-4DCF-B957-FDD1D783926A}" type="datetime1">
               <a:rPr lang="en-US" smtClean="0"/>
               <a:pPr/>
-              <a:t>6/13/2015</a:t>
+              <a:t>6/15/2015</a:t>
             </a:fld>
             <a:endParaRPr lang="en-US"/>
           </a:p>
@@ -856,7 +1437,7 @@
             <a:fld id="{D7DFE6A7-88F1-4FDA-93EA-C252B6CF00C8}" type="datetime1">
               <a:rPr lang="en-US" smtClean="0"/>
               <a:pPr/>
-              <a:t>6/13/2015</a:t>
+              <a:t>6/15/2015</a:t>
             </a:fld>
             <a:endParaRPr lang="en-US"/>
           </a:p>
@@ -1112,7 +1693,7 @@
             <a:fld id="{D01DCC59-108E-49D4-9A65-614F0F29D41F}" type="datetime1">
               <a:rPr lang="en-US" smtClean="0"/>
               <a:pPr/>
-              <a:t>6/13/2015</a:t>
+              <a:t>6/15/2015</a:t>
             </a:fld>
             <a:endParaRPr lang="en-US"/>
           </a:p>
@@ -1351,7 +1932,7 @@
             <a:fld id="{2D8D42EB-78C8-4F19-A512-31C48DB943E6}" type="datetime1">
               <a:rPr lang="en-US" smtClean="0"/>
               <a:pPr/>
-              <a:t>6/13/2015</a:t>
+              <a:t>6/15/2015</a:t>
             </a:fld>
             <a:endParaRPr lang="en-US"/>
           </a:p>
@@ -1583,7 +2164,7 @@
             <a:fld id="{87C8E3B4-E425-4688-9A97-8500629AFD6A}" type="datetime1">
               <a:rPr lang="en-US" smtClean="0"/>
               <a:pPr/>
-              <a:t>6/13/2015</a:t>
+              <a:t>6/15/2015</a:t>
             </a:fld>
             <a:endParaRPr lang="en-US"/>
           </a:p>
@@ -1709,7 +2290,7 @@
             <a:fld id="{2A651CF5-37D4-447B-8928-30C3EC73D95C}" type="datetime1">
               <a:rPr lang="en-US" smtClean="0"/>
               <a:pPr/>
-              <a:t>6/13/2015</a:t>
+              <a:t>6/15/2015</a:t>
             </a:fld>
             <a:endParaRPr lang="en-US"/>
           </a:p>
@@ -1902,7 +2483,7 @@
             <a:fld id="{54BB1E38-78A7-418E-B471-378A836405E4}" type="datetime1">
               <a:rPr lang="en-US" smtClean="0"/>
               <a:pPr/>
-              <a:t>6/13/2015</a:t>
+              <a:t>6/15/2015</a:t>
             </a:fld>
             <a:endParaRPr lang="en-US"/>
           </a:p>
@@ -2088,7 +2669,7 @@
             <a:fld id="{6284725B-EDA3-40A6-8072-BB6433687091}" type="datetime1">
               <a:rPr lang="en-US" smtClean="0"/>
               <a:pPr/>
-              <a:t>6/13/2015</a:t>
+              <a:t>6/15/2015</a:t>
             </a:fld>
             <a:endParaRPr lang="en-US"/>
           </a:p>
@@ -2306,7 +2887,7 @@
             <a:fld id="{4DEC2C5D-655E-4152-859F-3F8319264CD3}" type="datetime1">
               <a:rPr lang="en-US" smtClean="0"/>
               <a:pPr/>
-              <a:t>6/13/2015</a:t>
+              <a:t>6/15/2015</a:t>
             </a:fld>
             <a:endParaRPr lang="en-US"/>
           </a:p>
@@ -2655,7 +3236,7 @@
             <a:fld id="{D58D95B6-6C59-4277-8B48-8BF9EDA32D8E}" type="datetime1">
               <a:rPr lang="en-US" smtClean="0"/>
               <a:pPr/>
-              <a:t>6/13/2015</a:t>
+              <a:t>6/15/2015</a:t>
             </a:fld>
             <a:endParaRPr lang="en-US"/>
           </a:p>
@@ -2873,7 +3454,7 @@
             <a:fld id="{9A805D76-AC07-4CE3-996F-B93C9C507840}" type="datetime1">
               <a:rPr lang="en-US" smtClean="0"/>
               <a:pPr/>
-              <a:t>6/13/2015</a:t>
+              <a:t>6/15/2015</a:t>
             </a:fld>
             <a:endParaRPr lang="en-US"/>
           </a:p>
@@ -3008,7 +3589,7 @@
             <a:fld id="{62F60CE3-0F49-4BB6-A3EC-95CC3D68F124}" type="datetime1">
               <a:rPr lang="en-US" smtClean="0"/>
               <a:pPr/>
-              <a:t>6/13/2015</a:t>
+              <a:t>6/15/2015</a:t>
             </a:fld>
             <a:endParaRPr lang="en-US"/>
           </a:p>
@@ -3285,7 +3866,7 @@
             <a:fld id="{793DFF63-DE46-40A9-88D8-976CB0BE1FD7}" type="datetime1">
               <a:rPr lang="en-US" smtClean="0"/>
               <a:pPr/>
-              <a:t>6/13/2015</a:t>
+              <a:t>6/15/2015</a:t>
             </a:fld>
             <a:endParaRPr lang="en-US"/>
           </a:p>
@@ -5283,25 +5864,31 @@
           </a:p>
         </p:txBody>
       </p:sp>
-      <p:sp>
-        <p:nvSpPr>
-          <p:cNvPr id="11" name="Inhaltsplatzhalter 10"/>
-          <p:cNvSpPr>
-            <a:spLocks noGrp="1"/>
-          </p:cNvSpPr>
+      <p:graphicFrame>
+        <p:nvGraphicFramePr>
+          <p:cNvPr id="12" name="Inhaltsplatzhalter 11"/>
+          <p:cNvGraphicFramePr>
+            <a:graphicFrameLocks noGrp="1"/>
+          </p:cNvGraphicFramePr>
           <p:nvPr>
             <p:ph idx="1"/>
+            <p:extLst>
+              <p:ext uri="{D42A27DB-BD31-4B8C-83A1-F6EECF244321}">
+                <p14:modId xmlns:p14="http://schemas.microsoft.com/office/powerpoint/2010/main" val="4234972025"/>
+              </p:ext>
+            </p:extLst>
           </p:nvPr>
-        </p:nvSpPr>
-        <p:spPr/>
-        <p:txBody>
-          <a:bodyPr/>
-          <a:lstStyle/>
-          <a:p>
-            <a:endParaRPr lang="de-DE" dirty="0"/>
-          </a:p>
-        </p:txBody>
-      </p:sp>
+        </p:nvGraphicFramePr>
+        <p:xfrm>
+          <a:off x="213756" y="1294410"/>
+          <a:ext cx="8692738" cy="4500748"/>
+        </p:xfrm>
+        <a:graphic>
+          <a:graphicData uri="http://schemas.openxmlformats.org/drawingml/2006/chart">
+            <c:chart xmlns:c="http://schemas.openxmlformats.org/drawingml/2006/chart" xmlns:r="http://schemas.openxmlformats.org/officeDocument/2006/relationships" r:id="rId2"/>
+          </a:graphicData>
+        </a:graphic>
+      </p:graphicFrame>
     </p:spTree>
     <p:extLst>
       <p:ext uri="{BB962C8B-B14F-4D97-AF65-F5344CB8AC3E}">
@@ -6369,7 +6956,7 @@
       </p:sp>
       <p:sp>
         <p:nvSpPr>
-          <p:cNvPr id="11" name="Inhaltsplatzhalter 10"/>
+          <p:cNvPr id="2" name="Inhaltsplatzhalter 1"/>
           <p:cNvSpPr>
             <a:spLocks noGrp="1"/>
           </p:cNvSpPr>
@@ -6382,7 +6969,7 @@
           <a:bodyPr/>
           <a:lstStyle/>
           <a:p>
-            <a:endParaRPr lang="de-DE" dirty="0"/>
+            <a:endParaRPr lang="de-DE"/>
           </a:p>
         </p:txBody>
       </p:sp>
@@ -6725,25 +7312,31 @@
           </a:p>
         </p:txBody>
       </p:sp>
-      <p:sp>
-        <p:nvSpPr>
-          <p:cNvPr id="11" name="Inhaltsplatzhalter 10"/>
-          <p:cNvSpPr>
-            <a:spLocks noGrp="1"/>
-          </p:cNvSpPr>
+      <p:graphicFrame>
+        <p:nvGraphicFramePr>
+          <p:cNvPr id="12" name="Inhaltsplatzhalter 11"/>
+          <p:cNvGraphicFramePr>
+            <a:graphicFrameLocks noGrp="1"/>
+          </p:cNvGraphicFramePr>
           <p:nvPr>
             <p:ph idx="1"/>
+            <p:extLst>
+              <p:ext uri="{D42A27DB-BD31-4B8C-83A1-F6EECF244321}">
+                <p14:modId xmlns:p14="http://schemas.microsoft.com/office/powerpoint/2010/main" val="8024204"/>
+              </p:ext>
+            </p:extLst>
           </p:nvPr>
-        </p:nvSpPr>
-        <p:spPr/>
-        <p:txBody>
-          <a:bodyPr/>
-          <a:lstStyle/>
-          <a:p>
-            <a:endParaRPr lang="de-DE" dirty="0"/>
-          </a:p>
-        </p:txBody>
-      </p:sp>
+        </p:nvGraphicFramePr>
+        <p:xfrm>
+          <a:off x="201881" y="1341911"/>
+          <a:ext cx="8740238" cy="4310743"/>
+        </p:xfrm>
+        <a:graphic>
+          <a:graphicData uri="http://schemas.openxmlformats.org/drawingml/2006/chart">
+            <c:chart xmlns:c="http://schemas.openxmlformats.org/drawingml/2006/chart" xmlns:r="http://schemas.openxmlformats.org/officeDocument/2006/relationships" r:id="rId2"/>
+          </a:graphicData>
+        </a:graphic>
+      </p:graphicFrame>
     </p:spTree>
     <p:extLst>
       <p:ext uri="{BB962C8B-B14F-4D97-AF65-F5344CB8AC3E}">
@@ -8070,7 +8663,6 @@
               <a:rPr lang="de-DE" sz="4400" dirty="0" smtClean="0"/>
               <a:t> - Zitronensäure</a:t>
             </a:r>
-            <a:endParaRPr lang="de-DE" sz="4400" dirty="0" smtClean="0"/>
           </a:p>
           <a:p>
             <a:endParaRPr lang="de-DE" dirty="0"/>
@@ -10376,7 +10968,226 @@
   <p:timing>
     <p:tnLst>
       <p:par>
-        <p:cTn id="1" dur="indefinite" restart="never" nodeType="tmRoot"/>
+        <p:cTn id="1" dur="indefinite" restart="never" nodeType="tmRoot">
+          <p:childTnLst>
+            <p:seq concurrent="1" nextAc="seek">
+              <p:cTn id="2" dur="indefinite" nodeType="mainSeq">
+                <p:childTnLst>
+                  <p:par>
+                    <p:cTn id="3" fill="hold">
+                      <p:stCondLst>
+                        <p:cond delay="indefinite"/>
+                      </p:stCondLst>
+                      <p:childTnLst>
+                        <p:par>
+                          <p:cTn id="4" fill="hold">
+                            <p:stCondLst>
+                              <p:cond delay="0"/>
+                            </p:stCondLst>
+                            <p:childTnLst>
+                              <p:par>
+                                <p:cTn id="5" presetID="1" presetClass="entr" presetSubtype="0" fill="hold" nodeType="clickEffect">
+                                  <p:stCondLst>
+                                    <p:cond delay="0"/>
+                                  </p:stCondLst>
+                                  <p:childTnLst>
+                                    <p:set>
+                                      <p:cBhvr>
+                                        <p:cTn id="6" dur="1" fill="hold">
+                                          <p:stCondLst>
+                                            <p:cond delay="0"/>
+                                          </p:stCondLst>
+                                        </p:cTn>
+                                        <p:tgtEl>
+                                          <p:spTgt spid="4">
+                                            <p:txEl>
+                                              <p:pRg st="0" end="0"/>
+                                            </p:txEl>
+                                          </p:spTgt>
+                                        </p:tgtEl>
+                                        <p:attrNameLst>
+                                          <p:attrName>style.visibility</p:attrName>
+                                        </p:attrNameLst>
+                                      </p:cBhvr>
+                                      <p:to>
+                                        <p:strVal val="visible"/>
+                                      </p:to>
+                                    </p:set>
+                                  </p:childTnLst>
+                                </p:cTn>
+                              </p:par>
+                            </p:childTnLst>
+                          </p:cTn>
+                        </p:par>
+                      </p:childTnLst>
+                    </p:cTn>
+                  </p:par>
+                  <p:par>
+                    <p:cTn id="7" fill="hold">
+                      <p:stCondLst>
+                        <p:cond delay="indefinite"/>
+                      </p:stCondLst>
+                      <p:childTnLst>
+                        <p:par>
+                          <p:cTn id="8" fill="hold">
+                            <p:stCondLst>
+                              <p:cond delay="0"/>
+                            </p:stCondLst>
+                            <p:childTnLst>
+                              <p:par>
+                                <p:cTn id="9" presetID="1" presetClass="entr" presetSubtype="0" fill="hold" nodeType="clickEffect">
+                                  <p:stCondLst>
+                                    <p:cond delay="0"/>
+                                  </p:stCondLst>
+                                  <p:childTnLst>
+                                    <p:set>
+                                      <p:cBhvr>
+                                        <p:cTn id="10" dur="1" fill="hold">
+                                          <p:stCondLst>
+                                            <p:cond delay="0"/>
+                                          </p:stCondLst>
+                                        </p:cTn>
+                                        <p:tgtEl>
+                                          <p:spTgt spid="4">
+                                            <p:txEl>
+                                              <p:pRg st="1" end="1"/>
+                                            </p:txEl>
+                                          </p:spTgt>
+                                        </p:tgtEl>
+                                        <p:attrNameLst>
+                                          <p:attrName>style.visibility</p:attrName>
+                                        </p:attrNameLst>
+                                      </p:cBhvr>
+                                      <p:to>
+                                        <p:strVal val="visible"/>
+                                      </p:to>
+                                    </p:set>
+                                  </p:childTnLst>
+                                </p:cTn>
+                              </p:par>
+                            </p:childTnLst>
+                          </p:cTn>
+                        </p:par>
+                      </p:childTnLst>
+                    </p:cTn>
+                  </p:par>
+                  <p:par>
+                    <p:cTn id="11" fill="hold">
+                      <p:stCondLst>
+                        <p:cond delay="indefinite"/>
+                      </p:stCondLst>
+                      <p:childTnLst>
+                        <p:par>
+                          <p:cTn id="12" fill="hold">
+                            <p:stCondLst>
+                              <p:cond delay="0"/>
+                            </p:stCondLst>
+                            <p:childTnLst>
+                              <p:par>
+                                <p:cTn id="13" presetID="1" presetClass="entr" presetSubtype="0" fill="hold" nodeType="clickEffect">
+                                  <p:stCondLst>
+                                    <p:cond delay="0"/>
+                                  </p:stCondLst>
+                                  <p:childTnLst>
+                                    <p:set>
+                                      <p:cBhvr>
+                                        <p:cTn id="14" dur="1" fill="hold">
+                                          <p:stCondLst>
+                                            <p:cond delay="0"/>
+                                          </p:stCondLst>
+                                        </p:cTn>
+                                        <p:tgtEl>
+                                          <p:spTgt spid="4">
+                                            <p:txEl>
+                                              <p:pRg st="2" end="2"/>
+                                            </p:txEl>
+                                          </p:spTgt>
+                                        </p:tgtEl>
+                                        <p:attrNameLst>
+                                          <p:attrName>style.visibility</p:attrName>
+                                        </p:attrNameLst>
+                                      </p:cBhvr>
+                                      <p:to>
+                                        <p:strVal val="visible"/>
+                                      </p:to>
+                                    </p:set>
+                                  </p:childTnLst>
+                                </p:cTn>
+                              </p:par>
+                            </p:childTnLst>
+                          </p:cTn>
+                        </p:par>
+                      </p:childTnLst>
+                    </p:cTn>
+                  </p:par>
+                  <p:par>
+                    <p:cTn id="15" fill="hold">
+                      <p:stCondLst>
+                        <p:cond delay="indefinite"/>
+                      </p:stCondLst>
+                      <p:childTnLst>
+                        <p:par>
+                          <p:cTn id="16" fill="hold">
+                            <p:stCondLst>
+                              <p:cond delay="0"/>
+                            </p:stCondLst>
+                            <p:childTnLst>
+                              <p:par>
+                                <p:cTn id="17" presetID="1" presetClass="entr" presetSubtype="0" fill="hold" nodeType="clickEffect">
+                                  <p:stCondLst>
+                                    <p:cond delay="0"/>
+                                  </p:stCondLst>
+                                  <p:childTnLst>
+                                    <p:set>
+                                      <p:cBhvr>
+                                        <p:cTn id="18" dur="1" fill="hold">
+                                          <p:stCondLst>
+                                            <p:cond delay="0"/>
+                                          </p:stCondLst>
+                                        </p:cTn>
+                                        <p:tgtEl>
+                                          <p:spTgt spid="4">
+                                            <p:txEl>
+                                              <p:pRg st="3" end="3"/>
+                                            </p:txEl>
+                                          </p:spTgt>
+                                        </p:tgtEl>
+                                        <p:attrNameLst>
+                                          <p:attrName>style.visibility</p:attrName>
+                                        </p:attrNameLst>
+                                      </p:cBhvr>
+                                      <p:to>
+                                        <p:strVal val="visible"/>
+                                      </p:to>
+                                    </p:set>
+                                  </p:childTnLst>
+                                </p:cTn>
+                              </p:par>
+                            </p:childTnLst>
+                          </p:cTn>
+                        </p:par>
+                      </p:childTnLst>
+                    </p:cTn>
+                  </p:par>
+                </p:childTnLst>
+              </p:cTn>
+              <p:prevCondLst>
+                <p:cond evt="onPrev" delay="0">
+                  <p:tgtEl>
+                    <p:sldTgt/>
+                  </p:tgtEl>
+                </p:cond>
+              </p:prevCondLst>
+              <p:nextCondLst>
+                <p:cond evt="onNext" delay="0">
+                  <p:tgtEl>
+                    <p:sldTgt/>
+                  </p:tgtEl>
+                </p:cond>
+              </p:nextCondLst>
+            </p:seq>
+          </p:childTnLst>
+        </p:cTn>
       </p:par>
     </p:tnLst>
   </p:timing>
@@ -11373,7 +12184,79 @@
   <p:timing>
     <p:tnLst>
       <p:par>
-        <p:cTn id="1" dur="indefinite" restart="never" nodeType="tmRoot"/>
+        <p:cTn id="1" dur="indefinite" restart="never" nodeType="tmRoot">
+          <p:childTnLst>
+            <p:seq concurrent="1" nextAc="seek">
+              <p:cTn id="2" dur="indefinite" nodeType="mainSeq">
+                <p:childTnLst>
+                  <p:par>
+                    <p:cTn id="3" fill="hold">
+                      <p:stCondLst>
+                        <p:cond delay="indefinite"/>
+                      </p:stCondLst>
+                      <p:childTnLst>
+                        <p:par>
+                          <p:cTn id="4" fill="hold">
+                            <p:stCondLst>
+                              <p:cond delay="0"/>
+                            </p:stCondLst>
+                            <p:childTnLst>
+                              <p:par>
+                                <p:cTn id="5" presetID="1" presetClass="entr" presetSubtype="0" fill="hold" nodeType="clickEffect">
+                                  <p:stCondLst>
+                                    <p:cond delay="0"/>
+                                  </p:stCondLst>
+                                  <p:childTnLst>
+                                    <p:set>
+                                      <p:cBhvr>
+                                        <p:cTn id="6" dur="1" fill="hold">
+                                          <p:stCondLst>
+                                            <p:cond delay="0"/>
+                                          </p:stCondLst>
+                                        </p:cTn>
+                                        <p:tgtEl>
+                                          <p:spTgt spid="3">
+                                            <p:txEl>
+                                              <p:pRg st="0" end="0"/>
+                                            </p:txEl>
+                                          </p:spTgt>
+                                        </p:tgtEl>
+                                        <p:attrNameLst>
+                                          <p:attrName>style.visibility</p:attrName>
+                                        </p:attrNameLst>
+                                      </p:cBhvr>
+                                      <p:to>
+                                        <p:strVal val="visible"/>
+                                      </p:to>
+                                    </p:set>
+                                  </p:childTnLst>
+                                </p:cTn>
+                              </p:par>
+                            </p:childTnLst>
+                          </p:cTn>
+                        </p:par>
+                      </p:childTnLst>
+                    </p:cTn>
+                  </p:par>
+                </p:childTnLst>
+              </p:cTn>
+              <p:prevCondLst>
+                <p:cond evt="onPrev" delay="0">
+                  <p:tgtEl>
+                    <p:sldTgt/>
+                  </p:tgtEl>
+                </p:cond>
+              </p:prevCondLst>
+              <p:nextCondLst>
+                <p:cond evt="onNext" delay="0">
+                  <p:tgtEl>
+                    <p:sldTgt/>
+                  </p:tgtEl>
+                </p:cond>
+              </p:nextCondLst>
+            </p:seq>
+          </p:childTnLst>
+        </p:cTn>
       </p:par>
     </p:tnLst>
   </p:timing>

</xml_diff>